<commit_message>
Cambio de archivo Arquitectura
</commit_message>
<xml_diff>
--- a/ARQUITECTURA_SISTEMA.pptx
+++ b/ARQUITECTURA_SISTEMA.pptx
@@ -106,6 +106,11 @@
       </a:defRPr>
     </a:lvl9pPr>
   </p:defaultTextStyle>
+  <p:extLst>
+    <p:ext uri="{EFAFB233-063F-42B5-8137-9DF3F51BA10A}">
+      <p15:sldGuideLst xmlns:p15="http://schemas.microsoft.com/office/powerpoint/2012/main"/>
+    </p:ext>
+  </p:extLst>
 </p:presentation>
 </file>
 
@@ -258,7 +263,7 @@
           <a:p>
             <a:fld id="{9D850A3E-EDB3-480F-9A40-BF9D7ED9F2F1}" type="datetimeFigureOut">
               <a:rPr lang="es-CO" smtClean="0"/>
-              <a:t>15/11/2021</a:t>
+              <a:t>21/11/2021</a:t>
             </a:fld>
             <a:endParaRPr lang="es-CO"/>
           </a:p>
@@ -458,7 +463,7 @@
           <a:p>
             <a:fld id="{9D850A3E-EDB3-480F-9A40-BF9D7ED9F2F1}" type="datetimeFigureOut">
               <a:rPr lang="es-CO" smtClean="0"/>
-              <a:t>15/11/2021</a:t>
+              <a:t>21/11/2021</a:t>
             </a:fld>
             <a:endParaRPr lang="es-CO"/>
           </a:p>
@@ -668,7 +673,7 @@
           <a:p>
             <a:fld id="{9D850A3E-EDB3-480F-9A40-BF9D7ED9F2F1}" type="datetimeFigureOut">
               <a:rPr lang="es-CO" smtClean="0"/>
-              <a:t>15/11/2021</a:t>
+              <a:t>21/11/2021</a:t>
             </a:fld>
             <a:endParaRPr lang="es-CO"/>
           </a:p>
@@ -868,7 +873,7 @@
           <a:p>
             <a:fld id="{9D850A3E-EDB3-480F-9A40-BF9D7ED9F2F1}" type="datetimeFigureOut">
               <a:rPr lang="es-CO" smtClean="0"/>
-              <a:t>15/11/2021</a:t>
+              <a:t>21/11/2021</a:t>
             </a:fld>
             <a:endParaRPr lang="es-CO"/>
           </a:p>
@@ -1144,7 +1149,7 @@
           <a:p>
             <a:fld id="{9D850A3E-EDB3-480F-9A40-BF9D7ED9F2F1}" type="datetimeFigureOut">
               <a:rPr lang="es-CO" smtClean="0"/>
-              <a:t>15/11/2021</a:t>
+              <a:t>21/11/2021</a:t>
             </a:fld>
             <a:endParaRPr lang="es-CO"/>
           </a:p>
@@ -1412,7 +1417,7 @@
           <a:p>
             <a:fld id="{9D850A3E-EDB3-480F-9A40-BF9D7ED9F2F1}" type="datetimeFigureOut">
               <a:rPr lang="es-CO" smtClean="0"/>
-              <a:t>15/11/2021</a:t>
+              <a:t>21/11/2021</a:t>
             </a:fld>
             <a:endParaRPr lang="es-CO"/>
           </a:p>
@@ -1827,7 +1832,7 @@
           <a:p>
             <a:fld id="{9D850A3E-EDB3-480F-9A40-BF9D7ED9F2F1}" type="datetimeFigureOut">
               <a:rPr lang="es-CO" smtClean="0"/>
-              <a:t>15/11/2021</a:t>
+              <a:t>21/11/2021</a:t>
             </a:fld>
             <a:endParaRPr lang="es-CO"/>
           </a:p>
@@ -1969,7 +1974,7 @@
           <a:p>
             <a:fld id="{9D850A3E-EDB3-480F-9A40-BF9D7ED9F2F1}" type="datetimeFigureOut">
               <a:rPr lang="es-CO" smtClean="0"/>
-              <a:t>15/11/2021</a:t>
+              <a:t>21/11/2021</a:t>
             </a:fld>
             <a:endParaRPr lang="es-CO"/>
           </a:p>
@@ -2082,7 +2087,7 @@
           <a:p>
             <a:fld id="{9D850A3E-EDB3-480F-9A40-BF9D7ED9F2F1}" type="datetimeFigureOut">
               <a:rPr lang="es-CO" smtClean="0"/>
-              <a:t>15/11/2021</a:t>
+              <a:t>21/11/2021</a:t>
             </a:fld>
             <a:endParaRPr lang="es-CO"/>
           </a:p>
@@ -2395,7 +2400,7 @@
           <a:p>
             <a:fld id="{9D850A3E-EDB3-480F-9A40-BF9D7ED9F2F1}" type="datetimeFigureOut">
               <a:rPr lang="es-CO" smtClean="0"/>
-              <a:t>15/11/2021</a:t>
+              <a:t>21/11/2021</a:t>
             </a:fld>
             <a:endParaRPr lang="es-CO"/>
           </a:p>
@@ -2684,7 +2689,7 @@
           <a:p>
             <a:fld id="{9D850A3E-EDB3-480F-9A40-BF9D7ED9F2F1}" type="datetimeFigureOut">
               <a:rPr lang="es-CO" smtClean="0"/>
-              <a:t>15/11/2021</a:t>
+              <a:t>21/11/2021</a:t>
             </a:fld>
             <a:endParaRPr lang="es-CO"/>
           </a:p>
@@ -2927,7 +2932,7 @@
           <a:p>
             <a:fld id="{9D850A3E-EDB3-480F-9A40-BF9D7ED9F2F1}" type="datetimeFigureOut">
               <a:rPr lang="es-CO" smtClean="0"/>
-              <a:t>15/11/2021</a:t>
+              <a:t>21/11/2021</a:t>
             </a:fld>
             <a:endParaRPr lang="es-CO"/>
           </a:p>
@@ -3874,7 +3879,7 @@
           <a:p>
             <a:r>
               <a:rPr lang="en-US" sz="2200" dirty="0" err="1"/>
-              <a:t>Eliminacion</a:t>
+              <a:t>Eliminación</a:t>
             </a:r>
             <a:r>
               <a:rPr lang="en-US" sz="2200" dirty="0"/>
@@ -4364,44 +4369,33 @@
           </a:bodyPr>
           <a:lstStyle/>
           <a:p>
-            <a:endParaRPr lang="en-US" sz="2200" dirty="0"/>
-          </a:p>
-          <a:p>
+            <a:pPr marL="0" indent="0">
+              <a:buNone/>
+            </a:pPr>
+            <a:endParaRPr lang="en-US" sz="2200" u="sng" dirty="0"/>
+          </a:p>
+          <a:p>
+            <a:r>
+              <a:rPr lang="es-CO" sz="2200" dirty="0"/>
+              <a:t>Reserva</a:t>
+            </a:r>
+            <a:r>
+              <a:rPr lang="en-US" sz="2200" dirty="0"/>
+              <a:t> </a:t>
+            </a:r>
+          </a:p>
+          <a:p>
+            <a:r>
+              <a:rPr lang="es-CO" sz="2200" dirty="0"/>
+              <a:t>Cancelación</a:t>
+            </a:r>
+            <a:r>
+              <a:rPr lang="en-US" sz="2200" dirty="0"/>
+              <a:t> de </a:t>
+            </a:r>
             <a:r>
               <a:rPr lang="en-US" sz="2200" dirty="0" err="1"/>
-              <a:t>Suscripción</a:t>
-            </a:r>
-            <a:r>
-              <a:rPr lang="en-US" sz="2200" dirty="0"/>
-              <a:t> y </a:t>
-            </a:r>
-            <a:r>
-              <a:rPr lang="en-US" sz="2200" dirty="0" err="1"/>
-              <a:t>pago</a:t>
-            </a:r>
-            <a:r>
-              <a:rPr lang="en-US" sz="2200" dirty="0"/>
-              <a:t> de plan</a:t>
-            </a:r>
-          </a:p>
-          <a:p>
-            <a:r>
-              <a:rPr lang="en-US" sz="2200" dirty="0" err="1"/>
-              <a:t>Cancelacion</a:t>
-            </a:r>
-            <a:r>
-              <a:rPr lang="en-US" sz="2200" dirty="0"/>
-              <a:t> de plan</a:t>
-            </a:r>
-          </a:p>
-          <a:p>
-            <a:r>
-              <a:rPr lang="en-US" sz="2200" dirty="0"/>
-              <a:t>Cambio de </a:t>
-            </a:r>
-            <a:r>
-              <a:rPr lang="en-US" sz="2200" dirty="0" err="1"/>
-              <a:t>sede</a:t>
+              <a:t>reserva</a:t>
             </a:r>
             <a:endParaRPr lang="en-US" sz="2200" dirty="0"/>
           </a:p>

</xml_diff>